<commit_message>
Correção do diagrama de classes
</commit_message>
<xml_diff>
--- a/Documentacao/Apresentacao_entrega2.pptx
+++ b/Documentacao/Apresentacao_entrega2.pptx
@@ -210,7 +210,7 @@
           <a:p>
             <a:fld id="{F9865673-377E-497A-AE77-43B1B6B4B905}" type="datetimeFigureOut">
               <a:rPr lang="pt-PT"/>
-              <a:t>23/11/2021</a:t>
+              <a:t>24/11/2021</a:t>
             </a:fld>
             <a:endParaRPr lang="pt-PT"/>
           </a:p>
@@ -1061,7 +1061,7 @@
           <a:p>
             <a:fld id="{EA0C0817-A112-4847-8014-A94B7D2A4EA3}" type="datetime1">
               <a:rPr lang="en-US" smtClean="0"/>
-              <a:t>11/23/2021</a:t>
+              <a:t>11/24/2021</a:t>
             </a:fld>
             <a:endParaRPr lang="en-US" dirty="0"/>
           </a:p>
@@ -1263,7 +1263,7 @@
           <a:p>
             <a:fld id="{134F40B7-36AB-4376-BE14-EF7004D79BB9}" type="datetime1">
               <a:rPr lang="en-US" smtClean="0"/>
-              <a:t>11/23/2021</a:t>
+              <a:t>11/24/2021</a:t>
             </a:fld>
             <a:endParaRPr lang="en-US"/>
           </a:p>
@@ -1443,7 +1443,7 @@
           <a:p>
             <a:fld id="{FF87CAB8-DCAE-46A5-AADA-B3FAD11A54E0}" type="datetime1">
               <a:rPr lang="en-US" smtClean="0"/>
-              <a:t>11/23/2021</a:t>
+              <a:t>11/24/2021</a:t>
             </a:fld>
             <a:endParaRPr lang="en-US"/>
           </a:p>
@@ -1613,7 +1613,7 @@
           <a:p>
             <a:fld id="{7332B432-ACDA-4023-A761-2BAB76577B62}" type="datetime1">
               <a:rPr lang="en-US" smtClean="0"/>
-              <a:t>11/23/2021</a:t>
+              <a:t>11/24/2021</a:t>
             </a:fld>
             <a:endParaRPr lang="en-US"/>
           </a:p>
@@ -2212,7 +2212,7 @@
           <a:p>
             <a:fld id="{D9C646AA-F36E-4540-911D-FFFC0A0EF24A}" type="datetime1">
               <a:rPr lang="en-US" smtClean="0"/>
-              <a:t>11/23/2021</a:t>
+              <a:t>11/24/2021</a:t>
             </a:fld>
             <a:endParaRPr lang="en-US" dirty="0"/>
           </a:p>
@@ -2532,7 +2532,7 @@
           <a:p>
             <a:fld id="{69186D26-FA5F-4637-B602-B7C2DC34CFD4}" type="datetime1">
               <a:rPr lang="en-US" smtClean="0"/>
-              <a:t>11/23/2021</a:t>
+              <a:t>11/24/2021</a:t>
             </a:fld>
             <a:endParaRPr lang="en-US"/>
           </a:p>
@@ -2967,7 +2967,7 @@
           <a:p>
             <a:fld id="{8A7F15D8-96D1-4781-BC50-CA8A088B2FE4}" type="datetime1">
               <a:rPr lang="en-US" smtClean="0"/>
-              <a:t>11/23/2021</a:t>
+              <a:t>11/24/2021</a:t>
             </a:fld>
             <a:endParaRPr lang="en-US"/>
           </a:p>
@@ -3085,7 +3085,7 @@
           <a:p>
             <a:fld id="{F9A96C99-B8F8-4528-BD05-0E16E943DC09}" type="datetime1">
               <a:rPr lang="en-US" smtClean="0"/>
-              <a:t>11/23/2021</a:t>
+              <a:t>11/24/2021</a:t>
             </a:fld>
             <a:endParaRPr lang="en-US"/>
           </a:p>
@@ -3180,7 +3180,7 @@
           <a:p>
             <a:fld id="{03636942-C211-4B28-8DBD-C953E00AF71B}" type="datetime1">
               <a:rPr lang="en-US" smtClean="0"/>
-              <a:t>11/23/2021</a:t>
+              <a:t>11/24/2021</a:t>
             </a:fld>
             <a:endParaRPr lang="en-US"/>
           </a:p>
@@ -3597,7 +3597,7 @@
           <a:p>
             <a:fld id="{7E8D12A6-918A-48BD-8CB9-CA713993B0EA}" type="datetime1">
               <a:rPr lang="en-US" smtClean="0"/>
-              <a:t>11/23/2021</a:t>
+              <a:t>11/24/2021</a:t>
             </a:fld>
             <a:endParaRPr lang="en-US"/>
           </a:p>
@@ -3859,7 +3859,7 @@
             <a:fld id="{E778CE86-875F-4587-BCF6-FA054AFC0D53}" type="datetime1">
               <a:rPr lang="en-US" smtClean="0"/>
               <a:pPr/>
-              <a:t>11/23/2021</a:t>
+              <a:t>11/24/2021</a:t>
             </a:fld>
             <a:endParaRPr lang="en-US" dirty="0"/>
           </a:p>
@@ -4375,7 +4375,7 @@
           <a:p>
             <a:fld id="{F6FA2B21-3FCD-4721-B95C-427943F61125}" type="datetime1">
               <a:rPr lang="en-US" smtClean="0"/>
-              <a:t>11/23/2021</a:t>
+              <a:t>11/24/2021</a:t>
             </a:fld>
             <a:endParaRPr lang="en-US"/>
           </a:p>
@@ -6490,36 +6490,6 @@
           </a:p>
         </p:txBody>
       </p:sp>
-      <p:pic>
-        <p:nvPicPr>
-          <p:cNvPr id="8" name="Imagem 9">
-            <a:extLst>
-              <a:ext uri="{FF2B5EF4-FFF2-40B4-BE49-F238E27FC236}">
-                <a16:creationId xmlns:a16="http://schemas.microsoft.com/office/drawing/2014/main" id="{A77F8598-C9E2-49FD-BC89-28074A38D9DA}"/>
-              </a:ext>
-            </a:extLst>
-          </p:cNvPr>
-          <p:cNvPicPr>
-            <a:picLocks noChangeAspect="1"/>
-          </p:cNvPicPr>
-          <p:nvPr/>
-        </p:nvPicPr>
-        <p:blipFill>
-          <a:blip r:embed="rId2"/>
-          <a:stretch>
-            <a:fillRect/>
-          </a:stretch>
-        </p:blipFill>
-        <p:spPr>
-          <a:xfrm>
-            <a:off x="4865047" y="4213"/>
-            <a:ext cx="7329011" cy="6854092"/>
-          </a:xfrm>
-          <a:prstGeom prst="rect">
-            <a:avLst/>
-          </a:prstGeom>
-        </p:spPr>
-      </p:pic>
       <p:sp>
         <p:nvSpPr>
           <p:cNvPr id="12" name="Título 11">
@@ -6562,6 +6532,42 @@
           </a:p>
         </p:txBody>
       </p:sp>
+      <p:pic>
+        <p:nvPicPr>
+          <p:cNvPr id="3" name="Imagem 2">
+            <a:extLst>
+              <a:ext uri="{FF2B5EF4-FFF2-40B4-BE49-F238E27FC236}">
+                <a16:creationId xmlns:a16="http://schemas.microsoft.com/office/drawing/2014/main" id="{C4E21ACA-A0C1-4905-8385-CB6F0DB7238B}"/>
+              </a:ext>
+            </a:extLst>
+          </p:cNvPr>
+          <p:cNvPicPr>
+            <a:picLocks noChangeAspect="1"/>
+          </p:cNvPicPr>
+          <p:nvPr/>
+        </p:nvPicPr>
+        <p:blipFill>
+          <a:blip r:embed="rId2" cstate="print">
+            <a:extLst>
+              <a:ext uri="{28A0092B-C50C-407E-A947-70E740481C1C}">
+                <a14:useLocalDpi xmlns:a14="http://schemas.microsoft.com/office/drawing/2010/main" val="0"/>
+              </a:ext>
+            </a:extLst>
+          </a:blip>
+          <a:stretch>
+            <a:fillRect/>
+          </a:stretch>
+        </p:blipFill>
+        <p:spPr>
+          <a:xfrm>
+            <a:off x="4719851" y="0"/>
+            <a:ext cx="7472149" cy="6858000"/>
+          </a:xfrm>
+          <a:prstGeom prst="rect">
+            <a:avLst/>
+          </a:prstGeom>
+        </p:spPr>
+      </p:pic>
     </p:spTree>
     <p:extLst>
       <p:ext uri="{BB962C8B-B14F-4D97-AF65-F5344CB8AC3E}">

</xml_diff>